<commit_message>
aceptar en lugar de enviar
</commit_message>
<xml_diff>
--- a/botones2.pptx
+++ b/botones2.pptx
@@ -262,7 +262,7 @@
           <a:p>
             <a:fld id="{AEF95A7B-5902-4293-A5F8-A82BAD84AACF}" type="datetimeFigureOut">
               <a:rPr lang="es-MX" smtClean="0"/>
-              <a:t>10/06/2024</a:t>
+              <a:t>17/06/2024</a:t>
             </a:fld>
             <a:endParaRPr lang="es-MX"/>
           </a:p>
@@ -462,7 +462,7 @@
           <a:p>
             <a:fld id="{AEF95A7B-5902-4293-A5F8-A82BAD84AACF}" type="datetimeFigureOut">
               <a:rPr lang="es-MX" smtClean="0"/>
-              <a:t>10/06/2024</a:t>
+              <a:t>17/06/2024</a:t>
             </a:fld>
             <a:endParaRPr lang="es-MX"/>
           </a:p>
@@ -672,7 +672,7 @@
           <a:p>
             <a:fld id="{AEF95A7B-5902-4293-A5F8-A82BAD84AACF}" type="datetimeFigureOut">
               <a:rPr lang="es-MX" smtClean="0"/>
-              <a:t>10/06/2024</a:t>
+              <a:t>17/06/2024</a:t>
             </a:fld>
             <a:endParaRPr lang="es-MX"/>
           </a:p>
@@ -872,7 +872,7 @@
           <a:p>
             <a:fld id="{AEF95A7B-5902-4293-A5F8-A82BAD84AACF}" type="datetimeFigureOut">
               <a:rPr lang="es-MX" smtClean="0"/>
-              <a:t>10/06/2024</a:t>
+              <a:t>17/06/2024</a:t>
             </a:fld>
             <a:endParaRPr lang="es-MX"/>
           </a:p>
@@ -1148,7 +1148,7 @@
           <a:p>
             <a:fld id="{AEF95A7B-5902-4293-A5F8-A82BAD84AACF}" type="datetimeFigureOut">
               <a:rPr lang="es-MX" smtClean="0"/>
-              <a:t>10/06/2024</a:t>
+              <a:t>17/06/2024</a:t>
             </a:fld>
             <a:endParaRPr lang="es-MX"/>
           </a:p>
@@ -1416,7 +1416,7 @@
           <a:p>
             <a:fld id="{AEF95A7B-5902-4293-A5F8-A82BAD84AACF}" type="datetimeFigureOut">
               <a:rPr lang="es-MX" smtClean="0"/>
-              <a:t>10/06/2024</a:t>
+              <a:t>17/06/2024</a:t>
             </a:fld>
             <a:endParaRPr lang="es-MX"/>
           </a:p>
@@ -1831,7 +1831,7 @@
           <a:p>
             <a:fld id="{AEF95A7B-5902-4293-A5F8-A82BAD84AACF}" type="datetimeFigureOut">
               <a:rPr lang="es-MX" smtClean="0"/>
-              <a:t>10/06/2024</a:t>
+              <a:t>17/06/2024</a:t>
             </a:fld>
             <a:endParaRPr lang="es-MX"/>
           </a:p>
@@ -1973,7 +1973,7 @@
           <a:p>
             <a:fld id="{AEF95A7B-5902-4293-A5F8-A82BAD84AACF}" type="datetimeFigureOut">
               <a:rPr lang="es-MX" smtClean="0"/>
-              <a:t>10/06/2024</a:t>
+              <a:t>17/06/2024</a:t>
             </a:fld>
             <a:endParaRPr lang="es-MX"/>
           </a:p>
@@ -2086,7 +2086,7 @@
           <a:p>
             <a:fld id="{AEF95A7B-5902-4293-A5F8-A82BAD84AACF}" type="datetimeFigureOut">
               <a:rPr lang="es-MX" smtClean="0"/>
-              <a:t>10/06/2024</a:t>
+              <a:t>17/06/2024</a:t>
             </a:fld>
             <a:endParaRPr lang="es-MX"/>
           </a:p>
@@ -2399,7 +2399,7 @@
           <a:p>
             <a:fld id="{AEF95A7B-5902-4293-A5F8-A82BAD84AACF}" type="datetimeFigureOut">
               <a:rPr lang="es-MX" smtClean="0"/>
-              <a:t>10/06/2024</a:t>
+              <a:t>17/06/2024</a:t>
             </a:fld>
             <a:endParaRPr lang="es-MX"/>
           </a:p>
@@ -2688,7 +2688,7 @@
           <a:p>
             <a:fld id="{AEF95A7B-5902-4293-A5F8-A82BAD84AACF}" type="datetimeFigureOut">
               <a:rPr lang="es-MX" smtClean="0"/>
-              <a:t>10/06/2024</a:t>
+              <a:t>17/06/2024</a:t>
             </a:fld>
             <a:endParaRPr lang="es-MX"/>
           </a:p>
@@ -2931,7 +2931,7 @@
           <a:p>
             <a:fld id="{AEF95A7B-5902-4293-A5F8-A82BAD84AACF}" type="datetimeFigureOut">
               <a:rPr lang="es-MX" smtClean="0"/>
-              <a:t>10/06/2024</a:t>
+              <a:t>17/06/2024</a:t>
             </a:fld>
             <a:endParaRPr lang="es-MX"/>
           </a:p>
@@ -4855,6 +4855,132 @@
         <p:spPr>
           <a:xfrm>
             <a:off x="10409449" y="3343715"/>
+            <a:ext cx="1536700" cy="596900"/>
+          </a:xfrm>
+          <a:prstGeom prst="roundRect">
+            <a:avLst/>
+          </a:prstGeom>
+          <a:noFill/>
+          <a:ln w="38100">
+            <a:noFill/>
+          </a:ln>
+        </p:spPr>
+        <p:style>
+          <a:lnRef idx="2">
+            <a:schemeClr val="accent1">
+              <a:shade val="15000"/>
+            </a:schemeClr>
+          </a:lnRef>
+          <a:fillRef idx="1">
+            <a:schemeClr val="accent1"/>
+          </a:fillRef>
+          <a:effectRef idx="0">
+            <a:schemeClr val="accent1"/>
+          </a:effectRef>
+          <a:fontRef idx="minor">
+            <a:schemeClr val="lt1"/>
+          </a:fontRef>
+        </p:style>
+        <p:txBody>
+          <a:bodyPr rtlCol="0" anchor="ctr"/>
+          <a:lstStyle/>
+          <a:p>
+            <a:pPr algn="ctr"/>
+            <a:endParaRPr lang="es-MX">
+              <a:solidFill>
+                <a:schemeClr val="tx1"/>
+              </a:solidFill>
+              <a:latin typeface="Arial" panose="020B0604020202020204" pitchFamily="34" charset="0"/>
+              <a:cs typeface="Arial" panose="020B0604020202020204" pitchFamily="34" charset="0"/>
+            </a:endParaRPr>
+          </a:p>
+        </p:txBody>
+      </p:sp>
+      <p:sp>
+        <p:nvSpPr>
+          <p:cNvPr id="25" name="Rectángulo: esquinas redondeadas 24">
+            <a:extLst>
+              <a:ext uri="{FF2B5EF4-FFF2-40B4-BE49-F238E27FC236}">
+                <a16:creationId xmlns:a16="http://schemas.microsoft.com/office/drawing/2014/main" id="{C3026AA4-4DC9-FF8B-4E47-83B266A55E70}"/>
+              </a:ext>
+            </a:extLst>
+          </p:cNvPr>
+          <p:cNvSpPr/>
+          <p:nvPr/>
+        </p:nvSpPr>
+        <p:spPr>
+          <a:xfrm>
+            <a:off x="5224119" y="5108518"/>
+            <a:ext cx="1363080" cy="462326"/>
+          </a:xfrm>
+          <a:prstGeom prst="roundRect">
+            <a:avLst/>
+          </a:prstGeom>
+          <a:solidFill>
+            <a:srgbClr val="C79652"/>
+          </a:solidFill>
+          <a:ln>
+            <a:noFill/>
+          </a:ln>
+        </p:spPr>
+        <p:style>
+          <a:lnRef idx="2">
+            <a:schemeClr val="accent1">
+              <a:shade val="15000"/>
+            </a:schemeClr>
+          </a:lnRef>
+          <a:fillRef idx="1">
+            <a:schemeClr val="accent1"/>
+          </a:fillRef>
+          <a:effectRef idx="0">
+            <a:schemeClr val="accent1"/>
+          </a:effectRef>
+          <a:fontRef idx="minor">
+            <a:schemeClr val="lt1"/>
+          </a:fontRef>
+        </p:style>
+        <p:txBody>
+          <a:bodyPr rtlCol="0" anchor="ctr"/>
+          <a:lstStyle/>
+          <a:p>
+            <a:pPr algn="ctr"/>
+            <a:r>
+              <a:rPr lang="es-ES" sz="1200" dirty="0">
+                <a:solidFill>
+                  <a:schemeClr val="tx1"/>
+                </a:solidFill>
+                <a:latin typeface="Arial" panose="020B0604020202020204" pitchFamily="34" charset="0"/>
+                <a:ea typeface="Adobe Gothic Std B" panose="020B0800000000000000" pitchFamily="34" charset="-128"/>
+                <a:cs typeface="Arial" panose="020B0604020202020204" pitchFamily="34" charset="0"/>
+              </a:rPr>
+              <a:t>ACEPTAR</a:t>
+            </a:r>
+            <a:endParaRPr lang="es-MX" dirty="0">
+              <a:solidFill>
+                <a:schemeClr val="tx1"/>
+              </a:solidFill>
+              <a:latin typeface="Arial" panose="020B0604020202020204" pitchFamily="34" charset="0"/>
+              <a:ea typeface="Adobe Gothic Std B" panose="020B0800000000000000" pitchFamily="34" charset="-128"/>
+              <a:cs typeface="Arial" panose="020B0604020202020204" pitchFamily="34" charset="0"/>
+            </a:endParaRPr>
+          </a:p>
+        </p:txBody>
+      </p:sp>
+      <p:sp>
+        <p:nvSpPr>
+          <p:cNvPr id="26" name="Rectángulo: esquinas redondeadas 25">
+            <a:extLst>
+              <a:ext uri="{FF2B5EF4-FFF2-40B4-BE49-F238E27FC236}">
+                <a16:creationId xmlns:a16="http://schemas.microsoft.com/office/drawing/2014/main" id="{9B97185F-92E5-3273-7AAE-E38F6C0EC3CB}"/>
+              </a:ext>
+            </a:extLst>
+          </p:cNvPr>
+          <p:cNvSpPr/>
+          <p:nvPr/>
+        </p:nvSpPr>
+        <p:spPr>
+          <a:xfrm>
+            <a:off x="5137309" y="5041231"/>
             <a:ext cx="1536700" cy="596900"/>
           </a:xfrm>
           <a:prstGeom prst="roundRect">

</xml_diff>